<commit_message>
add some new icons
</commit_message>
<xml_diff>
--- a/spectroview/resources/icons/icon.pptx
+++ b/spectroview/resources/icons/icon.pptx
@@ -6,9 +6,10 @@
   </p:sldMasterIdLst>
   <p:sldIdLst>
     <p:sldId id="256" r:id="rId2"/>
-    <p:sldId id="257" r:id="rId3"/>
-    <p:sldId id="258" r:id="rId4"/>
-    <p:sldId id="259" r:id="rId5"/>
+    <p:sldId id="260" r:id="rId3"/>
+    <p:sldId id="257" r:id="rId4"/>
+    <p:sldId id="258" r:id="rId5"/>
+    <p:sldId id="259" r:id="rId6"/>
   </p:sldIdLst>
   <p:sldSz cx="12192000" cy="6858000"/>
   <p:notesSz cx="6858000" cy="9144000"/>
@@ -262,7 +263,7 @@
           <a:p>
             <a:fld id="{B9739118-5D76-D243-9607-339F9C0D3323}" type="datetimeFigureOut">
               <a:rPr lang="en-US" smtClean="0"/>
-              <a:t>7/5/25</a:t>
+              <a:t>9/8/2025</a:t>
             </a:fld>
             <a:endParaRPr lang="en-US"/>
           </a:p>
@@ -316,7 +317,7 @@
           <a:p>
             <a:fld id="{93A46D9C-AB76-C249-9469-514F26A85DAF}" type="slidenum">
               <a:rPr lang="en-US" smtClean="0"/>
-              <a:t>‹#›</a:t>
+              <a:t>‹N°›</a:t>
             </a:fld>
             <a:endParaRPr lang="en-US"/>
           </a:p>
@@ -460,7 +461,7 @@
           <a:p>
             <a:fld id="{B9739118-5D76-D243-9607-339F9C0D3323}" type="datetimeFigureOut">
               <a:rPr lang="en-US" smtClean="0"/>
-              <a:t>7/5/25</a:t>
+              <a:t>9/8/2025</a:t>
             </a:fld>
             <a:endParaRPr lang="en-US"/>
           </a:p>
@@ -514,7 +515,7 @@
           <a:p>
             <a:fld id="{93A46D9C-AB76-C249-9469-514F26A85DAF}" type="slidenum">
               <a:rPr lang="en-US" smtClean="0"/>
-              <a:t>‹#›</a:t>
+              <a:t>‹N°›</a:t>
             </a:fld>
             <a:endParaRPr lang="en-US"/>
           </a:p>
@@ -668,7 +669,7 @@
           <a:p>
             <a:fld id="{B9739118-5D76-D243-9607-339F9C0D3323}" type="datetimeFigureOut">
               <a:rPr lang="en-US" smtClean="0"/>
-              <a:t>7/5/25</a:t>
+              <a:t>9/8/2025</a:t>
             </a:fld>
             <a:endParaRPr lang="en-US"/>
           </a:p>
@@ -722,7 +723,7 @@
           <a:p>
             <a:fld id="{93A46D9C-AB76-C249-9469-514F26A85DAF}" type="slidenum">
               <a:rPr lang="en-US" smtClean="0"/>
-              <a:t>‹#›</a:t>
+              <a:t>‹N°›</a:t>
             </a:fld>
             <a:endParaRPr lang="en-US"/>
           </a:p>
@@ -866,7 +867,7 @@
           <a:p>
             <a:fld id="{B9739118-5D76-D243-9607-339F9C0D3323}" type="datetimeFigureOut">
               <a:rPr lang="en-US" smtClean="0"/>
-              <a:t>7/5/25</a:t>
+              <a:t>9/8/2025</a:t>
             </a:fld>
             <a:endParaRPr lang="en-US"/>
           </a:p>
@@ -920,7 +921,7 @@
           <a:p>
             <a:fld id="{93A46D9C-AB76-C249-9469-514F26A85DAF}" type="slidenum">
               <a:rPr lang="en-US" smtClean="0"/>
-              <a:t>‹#›</a:t>
+              <a:t>‹N°›</a:t>
             </a:fld>
             <a:endParaRPr lang="en-US"/>
           </a:p>
@@ -1141,7 +1142,7 @@
           <a:p>
             <a:fld id="{B9739118-5D76-D243-9607-339F9C0D3323}" type="datetimeFigureOut">
               <a:rPr lang="en-US" smtClean="0"/>
-              <a:t>7/5/25</a:t>
+              <a:t>9/8/2025</a:t>
             </a:fld>
             <a:endParaRPr lang="en-US"/>
           </a:p>
@@ -1195,7 +1196,7 @@
           <a:p>
             <a:fld id="{93A46D9C-AB76-C249-9469-514F26A85DAF}" type="slidenum">
               <a:rPr lang="en-US" smtClean="0"/>
-              <a:t>‹#›</a:t>
+              <a:t>‹N°›</a:t>
             </a:fld>
             <a:endParaRPr lang="en-US"/>
           </a:p>
@@ -1406,7 +1407,7 @@
           <a:p>
             <a:fld id="{B9739118-5D76-D243-9607-339F9C0D3323}" type="datetimeFigureOut">
               <a:rPr lang="en-US" smtClean="0"/>
-              <a:t>7/5/25</a:t>
+              <a:t>9/8/2025</a:t>
             </a:fld>
             <a:endParaRPr lang="en-US"/>
           </a:p>
@@ -1460,7 +1461,7 @@
           <a:p>
             <a:fld id="{93A46D9C-AB76-C249-9469-514F26A85DAF}" type="slidenum">
               <a:rPr lang="en-US" smtClean="0"/>
-              <a:t>‹#›</a:t>
+              <a:t>‹N°›</a:t>
             </a:fld>
             <a:endParaRPr lang="en-US"/>
           </a:p>
@@ -1818,7 +1819,7 @@
           <a:p>
             <a:fld id="{B9739118-5D76-D243-9607-339F9C0D3323}" type="datetimeFigureOut">
               <a:rPr lang="en-US" smtClean="0"/>
-              <a:t>7/5/25</a:t>
+              <a:t>9/8/2025</a:t>
             </a:fld>
             <a:endParaRPr lang="en-US"/>
           </a:p>
@@ -1872,7 +1873,7 @@
           <a:p>
             <a:fld id="{93A46D9C-AB76-C249-9469-514F26A85DAF}" type="slidenum">
               <a:rPr lang="en-US" smtClean="0"/>
-              <a:t>‹#›</a:t>
+              <a:t>‹N°›</a:t>
             </a:fld>
             <a:endParaRPr lang="en-US"/>
           </a:p>
@@ -1959,7 +1960,7 @@
           <a:p>
             <a:fld id="{B9739118-5D76-D243-9607-339F9C0D3323}" type="datetimeFigureOut">
               <a:rPr lang="en-US" smtClean="0"/>
-              <a:t>7/5/25</a:t>
+              <a:t>9/8/2025</a:t>
             </a:fld>
             <a:endParaRPr lang="en-US"/>
           </a:p>
@@ -2013,7 +2014,7 @@
           <a:p>
             <a:fld id="{93A46D9C-AB76-C249-9469-514F26A85DAF}" type="slidenum">
               <a:rPr lang="en-US" smtClean="0"/>
-              <a:t>‹#›</a:t>
+              <a:t>‹N°›</a:t>
             </a:fld>
             <a:endParaRPr lang="en-US"/>
           </a:p>
@@ -2072,7 +2073,7 @@
           <a:p>
             <a:fld id="{B9739118-5D76-D243-9607-339F9C0D3323}" type="datetimeFigureOut">
               <a:rPr lang="en-US" smtClean="0"/>
-              <a:t>7/5/25</a:t>
+              <a:t>9/8/2025</a:t>
             </a:fld>
             <a:endParaRPr lang="en-US"/>
           </a:p>
@@ -2126,7 +2127,7 @@
           <a:p>
             <a:fld id="{93A46D9C-AB76-C249-9469-514F26A85DAF}" type="slidenum">
               <a:rPr lang="en-US" smtClean="0"/>
-              <a:t>‹#›</a:t>
+              <a:t>‹N°›</a:t>
             </a:fld>
             <a:endParaRPr lang="en-US"/>
           </a:p>
@@ -2383,7 +2384,7 @@
           <a:p>
             <a:fld id="{B9739118-5D76-D243-9607-339F9C0D3323}" type="datetimeFigureOut">
               <a:rPr lang="en-US" smtClean="0"/>
-              <a:t>7/5/25</a:t>
+              <a:t>9/8/2025</a:t>
             </a:fld>
             <a:endParaRPr lang="en-US"/>
           </a:p>
@@ -2437,7 +2438,7 @@
           <a:p>
             <a:fld id="{93A46D9C-AB76-C249-9469-514F26A85DAF}" type="slidenum">
               <a:rPr lang="en-US" smtClean="0"/>
-              <a:t>‹#›</a:t>
+              <a:t>‹N°›</a:t>
             </a:fld>
             <a:endParaRPr lang="en-US"/>
           </a:p>
@@ -2671,7 +2672,7 @@
           <a:p>
             <a:fld id="{B9739118-5D76-D243-9607-339F9C0D3323}" type="datetimeFigureOut">
               <a:rPr lang="en-US" smtClean="0"/>
-              <a:t>7/5/25</a:t>
+              <a:t>9/8/2025</a:t>
             </a:fld>
             <a:endParaRPr lang="en-US"/>
           </a:p>
@@ -2725,7 +2726,7 @@
           <a:p>
             <a:fld id="{93A46D9C-AB76-C249-9469-514F26A85DAF}" type="slidenum">
               <a:rPr lang="en-US" smtClean="0"/>
-              <a:t>‹#›</a:t>
+              <a:t>‹N°›</a:t>
             </a:fld>
             <a:endParaRPr lang="en-US"/>
           </a:p>
@@ -2912,7 +2913,7 @@
           <a:p>
             <a:fld id="{B9739118-5D76-D243-9607-339F9C0D3323}" type="datetimeFigureOut">
               <a:rPr lang="en-US" smtClean="0"/>
-              <a:t>7/5/25</a:t>
+              <a:t>9/8/2025</a:t>
             </a:fld>
             <a:endParaRPr lang="en-US"/>
           </a:p>
@@ -3002,7 +3003,7 @@
           <a:p>
             <a:fld id="{93A46D9C-AB76-C249-9469-514F26A85DAF}" type="slidenum">
               <a:rPr lang="en-US" smtClean="0"/>
-              <a:t>‹#›</a:t>
+              <a:t>‹N°›</a:t>
             </a:fld>
             <a:endParaRPr lang="en-US"/>
           </a:p>
@@ -3344,9 +3345,9 @@
         <p:grpSpPr>
           <a:xfrm>
             <a:off x="3200400" y="2491257"/>
-            <a:ext cx="762000" cy="853192"/>
+            <a:ext cx="762000" cy="853193"/>
             <a:chOff x="3200400" y="2491257"/>
-            <a:chExt cx="762000" cy="853192"/>
+            <a:chExt cx="762000" cy="853193"/>
           </a:xfrm>
         </p:grpSpPr>
         <p:sp>
@@ -3497,7 +3498,7 @@
           <p:spPr>
             <a:xfrm flipV="1">
               <a:off x="3200400" y="2868460"/>
-              <a:ext cx="758997" cy="475989"/>
+              <a:ext cx="758997" cy="475990"/>
             </a:xfrm>
             <a:prstGeom prst="line">
               <a:avLst/>
@@ -3506,7 +3507,7 @@
               <a:solidFill>
                 <a:srgbClr val="D00000"/>
               </a:solidFill>
-              <a:prstDash val="sysDash"/>
+              <a:prstDash val="sysDot"/>
             </a:ln>
           </p:spPr>
           <p:style>
@@ -4006,7 +4007,7 @@
               <a:prstGeom prst="line">
                 <a:avLst/>
               </a:prstGeom>
-              <a:ln w="57150">
+              <a:ln w="76200">
                 <a:solidFill>
                   <a:srgbClr val="D00000"/>
                 </a:solidFill>
@@ -4432,6 +4433,489 @@
           </p:txBody>
         </p:sp>
       </p:grpSp>
+      <p:pic>
+        <p:nvPicPr>
+          <p:cNvPr id="3" name="Image 2">
+            <a:extLst>
+              <a:ext uri="{FF2B5EF4-FFF2-40B4-BE49-F238E27FC236}">
+                <a16:creationId xmlns:a16="http://schemas.microsoft.com/office/drawing/2014/main" id="{15BE14E6-1479-4439-8300-AEE70FAD7EBD}"/>
+              </a:ext>
+            </a:extLst>
+          </p:cNvPr>
+          <p:cNvPicPr>
+            <a:picLocks noChangeAspect="1"/>
+          </p:cNvPicPr>
+          <p:nvPr/>
+        </p:nvPicPr>
+        <p:blipFill>
+          <a:blip r:embed="rId2"/>
+          <a:stretch>
+            <a:fillRect/>
+          </a:stretch>
+        </p:blipFill>
+        <p:spPr>
+          <a:xfrm>
+            <a:off x="443249" y="270089"/>
+            <a:ext cx="2064282" cy="2064282"/>
+          </a:xfrm>
+          <a:prstGeom prst="rect">
+            <a:avLst/>
+          </a:prstGeom>
+        </p:spPr>
+      </p:pic>
+      <p:grpSp>
+        <p:nvGrpSpPr>
+          <p:cNvPr id="10" name="Groupe 9">
+            <a:extLst>
+              <a:ext uri="{FF2B5EF4-FFF2-40B4-BE49-F238E27FC236}">
+                <a16:creationId xmlns:a16="http://schemas.microsoft.com/office/drawing/2014/main" id="{F2477747-261E-45D2-AD36-6F267D2D6645}"/>
+              </a:ext>
+            </a:extLst>
+          </p:cNvPr>
+          <p:cNvGrpSpPr/>
+          <p:nvPr/>
+        </p:nvGrpSpPr>
+        <p:grpSpPr>
+          <a:xfrm>
+            <a:off x="10168767" y="1932376"/>
+            <a:ext cx="1181303" cy="1018811"/>
+            <a:chOff x="10168767" y="1932376"/>
+            <a:chExt cx="1181303" cy="1018811"/>
+          </a:xfrm>
+        </p:grpSpPr>
+        <p:sp>
+          <p:nvSpPr>
+            <p:cNvPr id="35" name="Rectangle : coins arrondis 34">
+              <a:extLst>
+                <a:ext uri="{FF2B5EF4-FFF2-40B4-BE49-F238E27FC236}">
+                  <a16:creationId xmlns:a16="http://schemas.microsoft.com/office/drawing/2014/main" id="{CE2E5D30-5573-461B-A42E-D923B5FC7203}"/>
+                </a:ext>
+              </a:extLst>
+            </p:cNvPr>
+            <p:cNvSpPr/>
+            <p:nvPr/>
+          </p:nvSpPr>
+          <p:spPr>
+            <a:xfrm>
+              <a:off x="10168767" y="2222689"/>
+              <a:ext cx="173500" cy="151338"/>
+            </a:xfrm>
+            <a:prstGeom prst="roundRect">
+              <a:avLst>
+                <a:gd name="adj" fmla="val 50000"/>
+              </a:avLst>
+            </a:prstGeom>
+            <a:noFill/>
+            <a:ln w="63500">
+              <a:solidFill>
+                <a:schemeClr val="tx1"/>
+              </a:solidFill>
+            </a:ln>
+          </p:spPr>
+          <p:style>
+            <a:lnRef idx="2">
+              <a:schemeClr val="accent1">
+                <a:shade val="50000"/>
+              </a:schemeClr>
+            </a:lnRef>
+            <a:fillRef idx="1">
+              <a:schemeClr val="accent1"/>
+            </a:fillRef>
+            <a:effectRef idx="0">
+              <a:schemeClr val="accent1"/>
+            </a:effectRef>
+            <a:fontRef idx="minor">
+              <a:schemeClr val="lt1"/>
+            </a:fontRef>
+          </p:style>
+          <p:txBody>
+            <a:bodyPr rtlCol="0" anchor="ctr"/>
+            <a:lstStyle/>
+            <a:p>
+              <a:pPr algn="ctr"/>
+              <a:endParaRPr lang="fr-FR"/>
+            </a:p>
+          </p:txBody>
+        </p:sp>
+        <p:sp>
+          <p:nvSpPr>
+            <p:cNvPr id="36" name="Rectangle : coins arrondis 35">
+              <a:extLst>
+                <a:ext uri="{FF2B5EF4-FFF2-40B4-BE49-F238E27FC236}">
+                  <a16:creationId xmlns:a16="http://schemas.microsoft.com/office/drawing/2014/main" id="{8185D1F9-54C4-4B20-A365-3834D09CD628}"/>
+                </a:ext>
+              </a:extLst>
+            </p:cNvPr>
+            <p:cNvSpPr/>
+            <p:nvPr/>
+          </p:nvSpPr>
+          <p:spPr>
+            <a:xfrm>
+              <a:off x="10168767" y="2514466"/>
+              <a:ext cx="173500" cy="151338"/>
+            </a:xfrm>
+            <a:prstGeom prst="roundRect">
+              <a:avLst>
+                <a:gd name="adj" fmla="val 50000"/>
+              </a:avLst>
+            </a:prstGeom>
+            <a:noFill/>
+            <a:ln w="63500">
+              <a:solidFill>
+                <a:schemeClr val="tx1"/>
+              </a:solidFill>
+            </a:ln>
+          </p:spPr>
+          <p:style>
+            <a:lnRef idx="2">
+              <a:schemeClr val="accent1">
+                <a:shade val="50000"/>
+              </a:schemeClr>
+            </a:lnRef>
+            <a:fillRef idx="1">
+              <a:schemeClr val="accent1"/>
+            </a:fillRef>
+            <a:effectRef idx="0">
+              <a:schemeClr val="accent1"/>
+            </a:effectRef>
+            <a:fontRef idx="minor">
+              <a:schemeClr val="lt1"/>
+            </a:fontRef>
+          </p:style>
+          <p:txBody>
+            <a:bodyPr rtlCol="0" anchor="ctr"/>
+            <a:lstStyle/>
+            <a:p>
+              <a:pPr algn="ctr"/>
+              <a:endParaRPr lang="fr-FR"/>
+            </a:p>
+          </p:txBody>
+        </p:sp>
+        <p:sp>
+          <p:nvSpPr>
+            <p:cNvPr id="37" name="Rectangle : coins arrondis 36">
+              <a:extLst>
+                <a:ext uri="{FF2B5EF4-FFF2-40B4-BE49-F238E27FC236}">
+                  <a16:creationId xmlns:a16="http://schemas.microsoft.com/office/drawing/2014/main" id="{1406288D-AA39-4905-8281-0EB4EDF4E092}"/>
+                </a:ext>
+              </a:extLst>
+            </p:cNvPr>
+            <p:cNvSpPr/>
+            <p:nvPr/>
+          </p:nvSpPr>
+          <p:spPr>
+            <a:xfrm>
+              <a:off x="10168767" y="2799849"/>
+              <a:ext cx="173500" cy="151338"/>
+            </a:xfrm>
+            <a:prstGeom prst="roundRect">
+              <a:avLst>
+                <a:gd name="adj" fmla="val 50000"/>
+              </a:avLst>
+            </a:prstGeom>
+            <a:noFill/>
+            <a:ln w="63500">
+              <a:solidFill>
+                <a:schemeClr val="tx1"/>
+              </a:solidFill>
+            </a:ln>
+          </p:spPr>
+          <p:style>
+            <a:lnRef idx="2">
+              <a:schemeClr val="accent1">
+                <a:shade val="50000"/>
+              </a:schemeClr>
+            </a:lnRef>
+            <a:fillRef idx="1">
+              <a:schemeClr val="accent1"/>
+            </a:fillRef>
+            <a:effectRef idx="0">
+              <a:schemeClr val="accent1"/>
+            </a:effectRef>
+            <a:fontRef idx="minor">
+              <a:schemeClr val="lt1"/>
+            </a:fontRef>
+          </p:style>
+          <p:txBody>
+            <a:bodyPr rtlCol="0" anchor="ctr"/>
+            <a:lstStyle/>
+            <a:p>
+              <a:pPr algn="ctr"/>
+              <a:endParaRPr lang="fr-FR"/>
+            </a:p>
+          </p:txBody>
+        </p:sp>
+        <p:sp>
+          <p:nvSpPr>
+            <p:cNvPr id="38" name="Rectangle : coins arrondis 37">
+              <a:extLst>
+                <a:ext uri="{FF2B5EF4-FFF2-40B4-BE49-F238E27FC236}">
+                  <a16:creationId xmlns:a16="http://schemas.microsoft.com/office/drawing/2014/main" id="{1F15C487-EB61-4061-9EB7-903C8CD37C0C}"/>
+                </a:ext>
+              </a:extLst>
+            </p:cNvPr>
+            <p:cNvSpPr/>
+            <p:nvPr/>
+          </p:nvSpPr>
+          <p:spPr>
+            <a:xfrm>
+              <a:off x="10537980" y="1932376"/>
+              <a:ext cx="812090" cy="151337"/>
+            </a:xfrm>
+            <a:prstGeom prst="roundRect">
+              <a:avLst>
+                <a:gd name="adj" fmla="val 50000"/>
+              </a:avLst>
+            </a:prstGeom>
+            <a:noFill/>
+            <a:ln w="63500">
+              <a:solidFill>
+                <a:schemeClr val="tx1"/>
+              </a:solidFill>
+            </a:ln>
+          </p:spPr>
+          <p:style>
+            <a:lnRef idx="2">
+              <a:schemeClr val="accent1">
+                <a:shade val="50000"/>
+              </a:schemeClr>
+            </a:lnRef>
+            <a:fillRef idx="1">
+              <a:schemeClr val="accent1"/>
+            </a:fillRef>
+            <a:effectRef idx="0">
+              <a:schemeClr val="accent1"/>
+            </a:effectRef>
+            <a:fontRef idx="minor">
+              <a:schemeClr val="lt1"/>
+            </a:fontRef>
+          </p:style>
+          <p:txBody>
+            <a:bodyPr rtlCol="0" anchor="ctr"/>
+            <a:lstStyle/>
+            <a:p>
+              <a:pPr algn="ctr"/>
+              <a:endParaRPr lang="fr-FR"/>
+            </a:p>
+          </p:txBody>
+        </p:sp>
+        <p:sp>
+          <p:nvSpPr>
+            <p:cNvPr id="39" name="Rectangle : coins arrondis 38">
+              <a:extLst>
+                <a:ext uri="{FF2B5EF4-FFF2-40B4-BE49-F238E27FC236}">
+                  <a16:creationId xmlns:a16="http://schemas.microsoft.com/office/drawing/2014/main" id="{1BA9E9F5-28F1-4B83-8448-9E2767A13E91}"/>
+                </a:ext>
+              </a:extLst>
+            </p:cNvPr>
+            <p:cNvSpPr/>
+            <p:nvPr/>
+          </p:nvSpPr>
+          <p:spPr>
+            <a:xfrm>
+              <a:off x="10168767" y="1932376"/>
+              <a:ext cx="173500" cy="151338"/>
+            </a:xfrm>
+            <a:prstGeom prst="roundRect">
+              <a:avLst>
+                <a:gd name="adj" fmla="val 50000"/>
+              </a:avLst>
+            </a:prstGeom>
+            <a:noFill/>
+            <a:ln w="63500">
+              <a:solidFill>
+                <a:schemeClr val="tx1"/>
+              </a:solidFill>
+            </a:ln>
+          </p:spPr>
+          <p:style>
+            <a:lnRef idx="2">
+              <a:schemeClr val="accent1">
+                <a:shade val="50000"/>
+              </a:schemeClr>
+            </a:lnRef>
+            <a:fillRef idx="1">
+              <a:schemeClr val="accent1"/>
+            </a:fillRef>
+            <a:effectRef idx="0">
+              <a:schemeClr val="accent1"/>
+            </a:effectRef>
+            <a:fontRef idx="minor">
+              <a:schemeClr val="lt1"/>
+            </a:fontRef>
+          </p:style>
+          <p:txBody>
+            <a:bodyPr rtlCol="0" anchor="ctr"/>
+            <a:lstStyle/>
+            <a:p>
+              <a:pPr algn="ctr"/>
+              <a:endParaRPr lang="fr-FR"/>
+            </a:p>
+          </p:txBody>
+        </p:sp>
+        <p:sp>
+          <p:nvSpPr>
+            <p:cNvPr id="40" name="Rectangle : coins arrondis 39">
+              <a:extLst>
+                <a:ext uri="{FF2B5EF4-FFF2-40B4-BE49-F238E27FC236}">
+                  <a16:creationId xmlns:a16="http://schemas.microsoft.com/office/drawing/2014/main" id="{85FB4F21-6F84-40DC-8245-AB45547DD0AF}"/>
+                </a:ext>
+              </a:extLst>
+            </p:cNvPr>
+            <p:cNvSpPr/>
+            <p:nvPr/>
+          </p:nvSpPr>
+          <p:spPr>
+            <a:xfrm>
+              <a:off x="10537980" y="2219181"/>
+              <a:ext cx="812090" cy="151337"/>
+            </a:xfrm>
+            <a:prstGeom prst="roundRect">
+              <a:avLst>
+                <a:gd name="adj" fmla="val 50000"/>
+              </a:avLst>
+            </a:prstGeom>
+            <a:noFill/>
+            <a:ln w="63500">
+              <a:solidFill>
+                <a:schemeClr val="tx1"/>
+              </a:solidFill>
+            </a:ln>
+          </p:spPr>
+          <p:style>
+            <a:lnRef idx="2">
+              <a:schemeClr val="accent1">
+                <a:shade val="50000"/>
+              </a:schemeClr>
+            </a:lnRef>
+            <a:fillRef idx="1">
+              <a:schemeClr val="accent1"/>
+            </a:fillRef>
+            <a:effectRef idx="0">
+              <a:schemeClr val="accent1"/>
+            </a:effectRef>
+            <a:fontRef idx="minor">
+              <a:schemeClr val="lt1"/>
+            </a:fontRef>
+          </p:style>
+          <p:txBody>
+            <a:bodyPr rtlCol="0" anchor="ctr"/>
+            <a:lstStyle/>
+            <a:p>
+              <a:pPr algn="ctr"/>
+              <a:endParaRPr lang="fr-FR"/>
+            </a:p>
+          </p:txBody>
+        </p:sp>
+        <p:sp>
+          <p:nvSpPr>
+            <p:cNvPr id="41" name="Rectangle : coins arrondis 40">
+              <a:extLst>
+                <a:ext uri="{FF2B5EF4-FFF2-40B4-BE49-F238E27FC236}">
+                  <a16:creationId xmlns:a16="http://schemas.microsoft.com/office/drawing/2014/main" id="{C4988242-E4EC-4A9B-927C-ADCEF5DF557C}"/>
+                </a:ext>
+              </a:extLst>
+            </p:cNvPr>
+            <p:cNvSpPr/>
+            <p:nvPr/>
+          </p:nvSpPr>
+          <p:spPr>
+            <a:xfrm>
+              <a:off x="10537980" y="2505986"/>
+              <a:ext cx="812090" cy="151337"/>
+            </a:xfrm>
+            <a:prstGeom prst="roundRect">
+              <a:avLst>
+                <a:gd name="adj" fmla="val 50000"/>
+              </a:avLst>
+            </a:prstGeom>
+            <a:noFill/>
+            <a:ln w="63500">
+              <a:solidFill>
+                <a:schemeClr val="tx1"/>
+              </a:solidFill>
+            </a:ln>
+          </p:spPr>
+          <p:style>
+            <a:lnRef idx="2">
+              <a:schemeClr val="accent1">
+                <a:shade val="50000"/>
+              </a:schemeClr>
+            </a:lnRef>
+            <a:fillRef idx="1">
+              <a:schemeClr val="accent1"/>
+            </a:fillRef>
+            <a:effectRef idx="0">
+              <a:schemeClr val="accent1"/>
+            </a:effectRef>
+            <a:fontRef idx="minor">
+              <a:schemeClr val="lt1"/>
+            </a:fontRef>
+          </p:style>
+          <p:txBody>
+            <a:bodyPr rtlCol="0" anchor="ctr"/>
+            <a:lstStyle/>
+            <a:p>
+              <a:pPr algn="ctr"/>
+              <a:endParaRPr lang="fr-FR"/>
+            </a:p>
+          </p:txBody>
+        </p:sp>
+        <p:sp>
+          <p:nvSpPr>
+            <p:cNvPr id="42" name="Rectangle : coins arrondis 41">
+              <a:extLst>
+                <a:ext uri="{FF2B5EF4-FFF2-40B4-BE49-F238E27FC236}">
+                  <a16:creationId xmlns:a16="http://schemas.microsoft.com/office/drawing/2014/main" id="{8168E9CC-501E-4992-AFA3-218025443D21}"/>
+                </a:ext>
+              </a:extLst>
+            </p:cNvPr>
+            <p:cNvSpPr/>
+            <p:nvPr/>
+          </p:nvSpPr>
+          <p:spPr>
+            <a:xfrm>
+              <a:off x="10537980" y="2792791"/>
+              <a:ext cx="812090" cy="151337"/>
+            </a:xfrm>
+            <a:prstGeom prst="roundRect">
+              <a:avLst>
+                <a:gd name="adj" fmla="val 50000"/>
+              </a:avLst>
+            </a:prstGeom>
+            <a:noFill/>
+            <a:ln w="63500">
+              <a:solidFill>
+                <a:schemeClr val="tx1"/>
+              </a:solidFill>
+            </a:ln>
+          </p:spPr>
+          <p:style>
+            <a:lnRef idx="2">
+              <a:schemeClr val="accent1">
+                <a:shade val="50000"/>
+              </a:schemeClr>
+            </a:lnRef>
+            <a:fillRef idx="1">
+              <a:schemeClr val="accent1"/>
+            </a:fillRef>
+            <a:effectRef idx="0">
+              <a:schemeClr val="accent1"/>
+            </a:effectRef>
+            <a:fontRef idx="minor">
+              <a:schemeClr val="lt1"/>
+            </a:fontRef>
+          </p:style>
+          <p:txBody>
+            <a:bodyPr rtlCol="0" anchor="ctr"/>
+            <a:lstStyle/>
+            <a:p>
+              <a:pPr algn="ctr"/>
+              <a:endParaRPr lang="fr-FR"/>
+            </a:p>
+          </p:txBody>
+        </p:sp>
+      </p:grpSp>
     </p:spTree>
     <p:extLst>
       <p:ext uri="{BB962C8B-B14F-4D97-AF65-F5344CB8AC3E}">
@@ -4446,6 +4930,555 @@
 </file>
 
 <file path=ppt/slides/slide2.xml><?xml version="1.0" encoding="utf-8"?>
+<p:sld xmlns:a="http://schemas.openxmlformats.org/drawingml/2006/main" xmlns:r="http://schemas.openxmlformats.org/officeDocument/2006/relationships" xmlns:p="http://schemas.openxmlformats.org/presentationml/2006/main">
+  <p:cSld>
+    <p:spTree>
+      <p:nvGrpSpPr>
+        <p:cNvPr id="1" name=""/>
+        <p:cNvGrpSpPr/>
+        <p:nvPr/>
+      </p:nvGrpSpPr>
+      <p:grpSpPr>
+        <a:xfrm>
+          <a:off x="0" y="0"/>
+          <a:ext cx="0" cy="0"/>
+          <a:chOff x="0" y="0"/>
+          <a:chExt cx="0" cy="0"/>
+        </a:xfrm>
+      </p:grpSpPr>
+      <p:grpSp>
+        <p:nvGrpSpPr>
+          <p:cNvPr id="7" name="Groupe 6">
+            <a:extLst>
+              <a:ext uri="{FF2B5EF4-FFF2-40B4-BE49-F238E27FC236}">
+                <a16:creationId xmlns:a16="http://schemas.microsoft.com/office/drawing/2014/main" id="{D5D37889-733F-4D85-993E-3FF25CAC561C}"/>
+              </a:ext>
+            </a:extLst>
+          </p:cNvPr>
+          <p:cNvGrpSpPr/>
+          <p:nvPr/>
+        </p:nvGrpSpPr>
+        <p:grpSpPr>
+          <a:xfrm>
+            <a:off x="3215024" y="198651"/>
+            <a:ext cx="2064282" cy="2064282"/>
+            <a:chOff x="443249" y="270089"/>
+            <a:chExt cx="2064282" cy="2064282"/>
+          </a:xfrm>
+        </p:grpSpPr>
+        <p:pic>
+          <p:nvPicPr>
+            <p:cNvPr id="8" name="Image 7">
+              <a:extLst>
+                <a:ext uri="{FF2B5EF4-FFF2-40B4-BE49-F238E27FC236}">
+                  <a16:creationId xmlns:a16="http://schemas.microsoft.com/office/drawing/2014/main" id="{131783B8-BCAF-4590-AAF4-DB4B9AFDFE9F}"/>
+                </a:ext>
+              </a:extLst>
+            </p:cNvPr>
+            <p:cNvPicPr>
+              <a:picLocks noChangeAspect="1"/>
+            </p:cNvPicPr>
+            <p:nvPr/>
+          </p:nvPicPr>
+          <p:blipFill>
+            <a:blip r:embed="rId2"/>
+            <a:stretch>
+              <a:fillRect/>
+            </a:stretch>
+          </p:blipFill>
+          <p:spPr>
+            <a:xfrm>
+              <a:off x="443249" y="270089"/>
+              <a:ext cx="2064282" cy="2064282"/>
+            </a:xfrm>
+            <a:prstGeom prst="rect">
+              <a:avLst/>
+            </a:prstGeom>
+          </p:spPr>
+        </p:pic>
+        <p:sp>
+          <p:nvSpPr>
+            <p:cNvPr id="9" name="Rectangle : coins arrondis 8">
+              <a:extLst>
+                <a:ext uri="{FF2B5EF4-FFF2-40B4-BE49-F238E27FC236}">
+                  <a16:creationId xmlns:a16="http://schemas.microsoft.com/office/drawing/2014/main" id="{868AD336-A778-4855-8A28-055AD9D1C208}"/>
+                </a:ext>
+              </a:extLst>
+            </p:cNvPr>
+            <p:cNvSpPr/>
+            <p:nvPr/>
+          </p:nvSpPr>
+          <p:spPr>
+            <a:xfrm>
+              <a:off x="722915" y="542611"/>
+              <a:ext cx="1504950" cy="1519237"/>
+            </a:xfrm>
+            <a:prstGeom prst="roundRect">
+              <a:avLst/>
+            </a:prstGeom>
+            <a:solidFill>
+              <a:srgbClr val="E8E8ED"/>
+            </a:solidFill>
+            <a:ln>
+              <a:solidFill>
+                <a:srgbClr val="E8E8ED"/>
+              </a:solidFill>
+            </a:ln>
+          </p:spPr>
+          <p:style>
+            <a:lnRef idx="2">
+              <a:schemeClr val="accent1">
+                <a:shade val="50000"/>
+              </a:schemeClr>
+            </a:lnRef>
+            <a:fillRef idx="1">
+              <a:schemeClr val="accent1"/>
+            </a:fillRef>
+            <a:effectRef idx="0">
+              <a:schemeClr val="accent1"/>
+            </a:effectRef>
+            <a:fontRef idx="minor">
+              <a:schemeClr val="lt1"/>
+            </a:fontRef>
+          </p:style>
+          <p:txBody>
+            <a:bodyPr rtlCol="0" anchor="ctr"/>
+            <a:lstStyle/>
+            <a:p>
+              <a:pPr algn="ctr"/>
+              <a:endParaRPr lang="fr-FR"/>
+            </a:p>
+          </p:txBody>
+        </p:sp>
+      </p:grpSp>
+      <p:grpSp>
+        <p:nvGrpSpPr>
+          <p:cNvPr id="10" name="Groupe 9">
+            <a:extLst>
+              <a:ext uri="{FF2B5EF4-FFF2-40B4-BE49-F238E27FC236}">
+                <a16:creationId xmlns:a16="http://schemas.microsoft.com/office/drawing/2014/main" id="{44057623-40AF-4390-BADE-E8EE452C6F21}"/>
+              </a:ext>
+            </a:extLst>
+          </p:cNvPr>
+          <p:cNvGrpSpPr/>
+          <p:nvPr/>
+        </p:nvGrpSpPr>
+        <p:grpSpPr>
+          <a:xfrm>
+            <a:off x="5880555" y="198651"/>
+            <a:ext cx="2064282" cy="2064282"/>
+            <a:chOff x="443249" y="270089"/>
+            <a:chExt cx="2064282" cy="2064282"/>
+          </a:xfrm>
+        </p:grpSpPr>
+        <p:pic>
+          <p:nvPicPr>
+            <p:cNvPr id="11" name="Image 10">
+              <a:extLst>
+                <a:ext uri="{FF2B5EF4-FFF2-40B4-BE49-F238E27FC236}">
+                  <a16:creationId xmlns:a16="http://schemas.microsoft.com/office/drawing/2014/main" id="{1DC39183-EB16-4BE2-88E5-6205737E7872}"/>
+                </a:ext>
+              </a:extLst>
+            </p:cNvPr>
+            <p:cNvPicPr>
+              <a:picLocks noChangeAspect="1"/>
+            </p:cNvPicPr>
+            <p:nvPr/>
+          </p:nvPicPr>
+          <p:blipFill>
+            <a:blip r:embed="rId2"/>
+            <a:stretch>
+              <a:fillRect/>
+            </a:stretch>
+          </p:blipFill>
+          <p:spPr>
+            <a:xfrm>
+              <a:off x="443249" y="270089"/>
+              <a:ext cx="2064282" cy="2064282"/>
+            </a:xfrm>
+            <a:prstGeom prst="rect">
+              <a:avLst/>
+            </a:prstGeom>
+          </p:spPr>
+        </p:pic>
+        <p:sp>
+          <p:nvSpPr>
+            <p:cNvPr id="12" name="Rectangle : coins arrondis 11">
+              <a:extLst>
+                <a:ext uri="{FF2B5EF4-FFF2-40B4-BE49-F238E27FC236}">
+                  <a16:creationId xmlns:a16="http://schemas.microsoft.com/office/drawing/2014/main" id="{D4C3DE70-BA4B-4CC6-BC38-3788665A2EAE}"/>
+                </a:ext>
+              </a:extLst>
+            </p:cNvPr>
+            <p:cNvSpPr/>
+            <p:nvPr/>
+          </p:nvSpPr>
+          <p:spPr>
+            <a:xfrm>
+              <a:off x="722915" y="542611"/>
+              <a:ext cx="1504950" cy="1519237"/>
+            </a:xfrm>
+            <a:prstGeom prst="roundRect">
+              <a:avLst/>
+            </a:prstGeom>
+            <a:solidFill>
+              <a:srgbClr val="E8E8ED"/>
+            </a:solidFill>
+            <a:ln>
+              <a:solidFill>
+                <a:srgbClr val="E8E8ED"/>
+              </a:solidFill>
+            </a:ln>
+          </p:spPr>
+          <p:style>
+            <a:lnRef idx="2">
+              <a:schemeClr val="accent1">
+                <a:shade val="50000"/>
+              </a:schemeClr>
+            </a:lnRef>
+            <a:fillRef idx="1">
+              <a:schemeClr val="accent1"/>
+            </a:fillRef>
+            <a:effectRef idx="0">
+              <a:schemeClr val="accent1"/>
+            </a:effectRef>
+            <a:fontRef idx="minor">
+              <a:schemeClr val="lt1"/>
+            </a:fontRef>
+          </p:style>
+          <p:txBody>
+            <a:bodyPr rtlCol="0" anchor="ctr"/>
+            <a:lstStyle/>
+            <a:p>
+              <a:pPr algn="ctr"/>
+              <a:endParaRPr lang="fr-FR"/>
+            </a:p>
+          </p:txBody>
+        </p:sp>
+      </p:grpSp>
+      <p:grpSp>
+        <p:nvGrpSpPr>
+          <p:cNvPr id="16" name="Groupe 15">
+            <a:extLst>
+              <a:ext uri="{FF2B5EF4-FFF2-40B4-BE49-F238E27FC236}">
+                <a16:creationId xmlns:a16="http://schemas.microsoft.com/office/drawing/2014/main" id="{7B06405D-5ADD-464D-AF60-95237C766B93}"/>
+              </a:ext>
+            </a:extLst>
+          </p:cNvPr>
+          <p:cNvGrpSpPr/>
+          <p:nvPr/>
+        </p:nvGrpSpPr>
+        <p:grpSpPr>
+          <a:xfrm>
+            <a:off x="262274" y="198651"/>
+            <a:ext cx="2064282" cy="2064282"/>
+            <a:chOff x="262274" y="198651"/>
+            <a:chExt cx="2064282" cy="2064282"/>
+          </a:xfrm>
+        </p:grpSpPr>
+        <p:grpSp>
+          <p:nvGrpSpPr>
+            <p:cNvPr id="6" name="Groupe 5">
+              <a:extLst>
+                <a:ext uri="{FF2B5EF4-FFF2-40B4-BE49-F238E27FC236}">
+                  <a16:creationId xmlns:a16="http://schemas.microsoft.com/office/drawing/2014/main" id="{17786929-5888-46A1-A644-BBF872718226}"/>
+                </a:ext>
+              </a:extLst>
+            </p:cNvPr>
+            <p:cNvGrpSpPr/>
+            <p:nvPr/>
+          </p:nvGrpSpPr>
+          <p:grpSpPr>
+            <a:xfrm>
+              <a:off x="262274" y="198651"/>
+              <a:ext cx="2064282" cy="2064282"/>
+              <a:chOff x="443249" y="270089"/>
+              <a:chExt cx="2064282" cy="2064282"/>
+            </a:xfrm>
+          </p:grpSpPr>
+          <p:pic>
+            <p:nvPicPr>
+              <p:cNvPr id="4" name="Image 3">
+                <a:extLst>
+                  <a:ext uri="{FF2B5EF4-FFF2-40B4-BE49-F238E27FC236}">
+                    <a16:creationId xmlns:a16="http://schemas.microsoft.com/office/drawing/2014/main" id="{283B6144-FA0A-414D-80FF-0569E98C2629}"/>
+                  </a:ext>
+                </a:extLst>
+              </p:cNvPr>
+              <p:cNvPicPr>
+                <a:picLocks noChangeAspect="1"/>
+              </p:cNvPicPr>
+              <p:nvPr/>
+            </p:nvPicPr>
+            <p:blipFill>
+              <a:blip r:embed="rId2"/>
+              <a:stretch>
+                <a:fillRect/>
+              </a:stretch>
+            </p:blipFill>
+            <p:spPr>
+              <a:xfrm>
+                <a:off x="443249" y="270089"/>
+                <a:ext cx="2064282" cy="2064282"/>
+              </a:xfrm>
+              <a:prstGeom prst="rect">
+                <a:avLst/>
+              </a:prstGeom>
+            </p:spPr>
+          </p:pic>
+          <p:sp>
+            <p:nvSpPr>
+              <p:cNvPr id="5" name="Rectangle : coins arrondis 4">
+                <a:extLst>
+                  <a:ext uri="{FF2B5EF4-FFF2-40B4-BE49-F238E27FC236}">
+                    <a16:creationId xmlns:a16="http://schemas.microsoft.com/office/drawing/2014/main" id="{C397E8FD-B12F-441D-B524-B10B75884432}"/>
+                  </a:ext>
+                </a:extLst>
+              </p:cNvPr>
+              <p:cNvSpPr/>
+              <p:nvPr/>
+            </p:nvSpPr>
+            <p:spPr>
+              <a:xfrm>
+                <a:off x="722915" y="542611"/>
+                <a:ext cx="1504950" cy="1519237"/>
+              </a:xfrm>
+              <a:prstGeom prst="roundRect">
+                <a:avLst/>
+              </a:prstGeom>
+              <a:solidFill>
+                <a:srgbClr val="E8E8ED"/>
+              </a:solidFill>
+              <a:ln>
+                <a:solidFill>
+                  <a:srgbClr val="E8E8ED"/>
+                </a:solidFill>
+              </a:ln>
+            </p:spPr>
+            <p:style>
+              <a:lnRef idx="2">
+                <a:schemeClr val="accent1">
+                  <a:shade val="50000"/>
+                </a:schemeClr>
+              </a:lnRef>
+              <a:fillRef idx="1">
+                <a:schemeClr val="accent1"/>
+              </a:fillRef>
+              <a:effectRef idx="0">
+                <a:schemeClr val="accent1"/>
+              </a:effectRef>
+              <a:fontRef idx="minor">
+                <a:schemeClr val="lt1"/>
+              </a:fontRef>
+            </p:style>
+            <p:txBody>
+              <a:bodyPr rtlCol="0" anchor="ctr"/>
+              <a:lstStyle/>
+              <a:p>
+                <a:pPr algn="ctr"/>
+                <a:endParaRPr lang="fr-FR"/>
+              </a:p>
+            </p:txBody>
+          </p:sp>
+        </p:grpSp>
+        <p:grpSp>
+          <p:nvGrpSpPr>
+            <p:cNvPr id="13" name="Groupe 12">
+              <a:extLst>
+                <a:ext uri="{FF2B5EF4-FFF2-40B4-BE49-F238E27FC236}">
+                  <a16:creationId xmlns:a16="http://schemas.microsoft.com/office/drawing/2014/main" id="{A06C0AC7-9446-4A0D-B575-EB94D79FD399}"/>
+                </a:ext>
+              </a:extLst>
+            </p:cNvPr>
+            <p:cNvGrpSpPr/>
+            <p:nvPr/>
+          </p:nvGrpSpPr>
+          <p:grpSpPr>
+            <a:xfrm>
+              <a:off x="541942" y="450507"/>
+              <a:ext cx="1531615" cy="1314350"/>
+              <a:chOff x="1981200" y="4768594"/>
+              <a:chExt cx="1107494" cy="950392"/>
+            </a:xfrm>
+          </p:grpSpPr>
+          <p:sp>
+            <p:nvSpPr>
+              <p:cNvPr id="14" name="Freeform 12">
+                <a:extLst>
+                  <a:ext uri="{FF2B5EF4-FFF2-40B4-BE49-F238E27FC236}">
+                    <a16:creationId xmlns:a16="http://schemas.microsoft.com/office/drawing/2014/main" id="{57584AAC-680F-4BB0-A619-269EBDC496A2}"/>
+                  </a:ext>
+                </a:extLst>
+              </p:cNvPr>
+              <p:cNvSpPr/>
+              <p:nvPr/>
+            </p:nvSpPr>
+            <p:spPr>
+              <a:xfrm>
+                <a:off x="1981200" y="4951448"/>
+                <a:ext cx="953633" cy="767538"/>
+              </a:xfrm>
+              <a:custGeom>
+                <a:avLst/>
+                <a:gdLst>
+                  <a:gd name="connsiteX0" fmla="*/ 0 w 1262743"/>
+                  <a:gd name="connsiteY0" fmla="*/ 1175986 h 1175986"/>
+                  <a:gd name="connsiteX1" fmla="*/ 478972 w 1262743"/>
+                  <a:gd name="connsiteY1" fmla="*/ 914729 h 1175986"/>
+                  <a:gd name="connsiteX2" fmla="*/ 609600 w 1262743"/>
+                  <a:gd name="connsiteY2" fmla="*/ 329 h 1175986"/>
+                  <a:gd name="connsiteX3" fmla="*/ 849086 w 1262743"/>
+                  <a:gd name="connsiteY3" fmla="*/ 1023586 h 1175986"/>
+                  <a:gd name="connsiteX4" fmla="*/ 1262743 w 1262743"/>
+                  <a:gd name="connsiteY4" fmla="*/ 1154215 h 1175986"/>
+                </a:gdLst>
+                <a:ahLst/>
+                <a:cxnLst>
+                  <a:cxn ang="0">
+                    <a:pos x="connsiteX0" y="connsiteY0"/>
+                  </a:cxn>
+                  <a:cxn ang="0">
+                    <a:pos x="connsiteX1" y="connsiteY1"/>
+                  </a:cxn>
+                  <a:cxn ang="0">
+                    <a:pos x="connsiteX2" y="connsiteY2"/>
+                  </a:cxn>
+                  <a:cxn ang="0">
+                    <a:pos x="connsiteX3" y="connsiteY3"/>
+                  </a:cxn>
+                  <a:cxn ang="0">
+                    <a:pos x="connsiteX4" y="connsiteY4"/>
+                  </a:cxn>
+                </a:cxnLst>
+                <a:rect l="l" t="t" r="r" b="b"/>
+                <a:pathLst>
+                  <a:path w="1262743" h="1175986">
+                    <a:moveTo>
+                      <a:pt x="0" y="1175986"/>
+                    </a:moveTo>
+                    <a:cubicBezTo>
+                      <a:pt x="188686" y="1143329"/>
+                      <a:pt x="377372" y="1110672"/>
+                      <a:pt x="478972" y="914729"/>
+                    </a:cubicBezTo>
+                    <a:cubicBezTo>
+                      <a:pt x="580572" y="718786"/>
+                      <a:pt x="547914" y="-17814"/>
+                      <a:pt x="609600" y="329"/>
+                    </a:cubicBezTo>
+                    <a:cubicBezTo>
+                      <a:pt x="671286" y="18472"/>
+                      <a:pt x="740229" y="831272"/>
+                      <a:pt x="849086" y="1023586"/>
+                    </a:cubicBezTo>
+                    <a:cubicBezTo>
+                      <a:pt x="957943" y="1215900"/>
+                      <a:pt x="1197429" y="1132444"/>
+                      <a:pt x="1262743" y="1154215"/>
+                    </a:cubicBezTo>
+                  </a:path>
+                </a:pathLst>
+              </a:custGeom>
+              <a:noFill/>
+              <a:ln w="101600">
+                <a:solidFill>
+                  <a:schemeClr val="tx1"/>
+                </a:solidFill>
+              </a:ln>
+            </p:spPr>
+            <p:style>
+              <a:lnRef idx="2">
+                <a:schemeClr val="accent1">
+                  <a:shade val="15000"/>
+                </a:schemeClr>
+              </a:lnRef>
+              <a:fillRef idx="1">
+                <a:schemeClr val="accent1"/>
+              </a:fillRef>
+              <a:effectRef idx="0">
+                <a:schemeClr val="accent1"/>
+              </a:effectRef>
+              <a:fontRef idx="minor">
+                <a:schemeClr val="lt1"/>
+              </a:fontRef>
+            </p:style>
+            <p:txBody>
+              <a:bodyPr rtlCol="0" anchor="ctr"/>
+              <a:lstStyle/>
+              <a:p>
+                <a:pPr algn="ctr"/>
+                <a:endParaRPr lang="en-US" dirty="0"/>
+              </a:p>
+            </p:txBody>
+          </p:sp>
+          <p:sp>
+            <p:nvSpPr>
+              <p:cNvPr id="15" name="Rectangle : coins arrondis 14">
+                <a:extLst>
+                  <a:ext uri="{FF2B5EF4-FFF2-40B4-BE49-F238E27FC236}">
+                    <a16:creationId xmlns:a16="http://schemas.microsoft.com/office/drawing/2014/main" id="{85A12E84-299C-45CA-8867-F56414103C60}"/>
+                  </a:ext>
+                </a:extLst>
+              </p:cNvPr>
+              <p:cNvSpPr/>
+              <p:nvPr/>
+            </p:nvSpPr>
+            <p:spPr>
+              <a:xfrm>
+                <a:off x="2611171" y="4768594"/>
+                <a:ext cx="477523" cy="326186"/>
+              </a:xfrm>
+              <a:prstGeom prst="roundRect">
+                <a:avLst/>
+              </a:prstGeom>
+              <a:noFill/>
+              <a:ln w="76200">
+                <a:solidFill>
+                  <a:srgbClr val="0070C0"/>
+                </a:solidFill>
+              </a:ln>
+            </p:spPr>
+            <p:style>
+              <a:lnRef idx="2">
+                <a:schemeClr val="accent1">
+                  <a:shade val="50000"/>
+                </a:schemeClr>
+              </a:lnRef>
+              <a:fillRef idx="1">
+                <a:schemeClr val="accent1"/>
+              </a:fillRef>
+              <a:effectRef idx="0">
+                <a:schemeClr val="accent1"/>
+              </a:effectRef>
+              <a:fontRef idx="minor">
+                <a:schemeClr val="lt1"/>
+              </a:fontRef>
+            </p:style>
+            <p:txBody>
+              <a:bodyPr rtlCol="0" anchor="ctr"/>
+              <a:lstStyle/>
+              <a:p>
+                <a:pPr algn="ctr"/>
+                <a:endParaRPr lang="en-US"/>
+              </a:p>
+            </p:txBody>
+          </p:sp>
+        </p:grpSp>
+      </p:grpSp>
+    </p:spTree>
+    <p:extLst>
+      <p:ext uri="{BB962C8B-B14F-4D97-AF65-F5344CB8AC3E}">
+        <p14:creationId xmlns:p14="http://schemas.microsoft.com/office/powerpoint/2010/main" val="2574477916"/>
+      </p:ext>
+    </p:extLst>
+  </p:cSld>
+  <p:clrMapOvr>
+    <a:masterClrMapping/>
+  </p:clrMapOvr>
+</p:sld>
+</file>
+
+<file path=ppt/slides/slide3.xml><?xml version="1.0" encoding="utf-8"?>
 <p:sld xmlns:a="http://schemas.openxmlformats.org/drawingml/2006/main" xmlns:r="http://schemas.openxmlformats.org/officeDocument/2006/relationships" xmlns:p="http://schemas.openxmlformats.org/presentationml/2006/main">
   <p:cSld>
     <p:spTree>
@@ -5910,7 +6943,7 @@
 </p:sld>
 </file>
 
-<file path=ppt/slides/slide3.xml><?xml version="1.0" encoding="utf-8"?>
+<file path=ppt/slides/slide4.xml><?xml version="1.0" encoding="utf-8"?>
 <p:sld xmlns:a="http://schemas.openxmlformats.org/drawingml/2006/main" xmlns:r="http://schemas.openxmlformats.org/officeDocument/2006/relationships" xmlns:p="http://schemas.openxmlformats.org/presentationml/2006/main">
   <p:cSld>
     <p:spTree>
@@ -7455,7 +8488,7 @@
 </p:sld>
 </file>
 
-<file path=ppt/slides/slide4.xml><?xml version="1.0" encoding="utf-8"?>
+<file path=ppt/slides/slide5.xml><?xml version="1.0" encoding="utf-8"?>
 <p:sld xmlns:a="http://schemas.openxmlformats.org/drawingml/2006/main" xmlns:r="http://schemas.openxmlformats.org/officeDocument/2006/relationships" xmlns:p="http://schemas.openxmlformats.org/presentationml/2006/main">
   <p:cSld>
     <p:spTree>

</xml_diff>

<commit_message>
Move Option "Show/Hide" bestfit lines into the Toolbar
</commit_message>
<xml_diff>
--- a/spectroview/resources/icons/icon.pptx
+++ b/spectroview/resources/icons/icon.pptx
@@ -263,7 +263,7 @@
           <a:p>
             <a:fld id="{B9739118-5D76-D243-9607-339F9C0D3323}" type="datetimeFigureOut">
               <a:rPr lang="en-US" smtClean="0"/>
-              <a:t>9/8/2025</a:t>
+              <a:t>2/10/2026</a:t>
             </a:fld>
             <a:endParaRPr lang="en-US"/>
           </a:p>
@@ -461,7 +461,7 @@
           <a:p>
             <a:fld id="{B9739118-5D76-D243-9607-339F9C0D3323}" type="datetimeFigureOut">
               <a:rPr lang="en-US" smtClean="0"/>
-              <a:t>9/8/2025</a:t>
+              <a:t>2/10/2026</a:t>
             </a:fld>
             <a:endParaRPr lang="en-US"/>
           </a:p>
@@ -669,7 +669,7 @@
           <a:p>
             <a:fld id="{B9739118-5D76-D243-9607-339F9C0D3323}" type="datetimeFigureOut">
               <a:rPr lang="en-US" smtClean="0"/>
-              <a:t>9/8/2025</a:t>
+              <a:t>2/10/2026</a:t>
             </a:fld>
             <a:endParaRPr lang="en-US"/>
           </a:p>
@@ -867,7 +867,7 @@
           <a:p>
             <a:fld id="{B9739118-5D76-D243-9607-339F9C0D3323}" type="datetimeFigureOut">
               <a:rPr lang="en-US" smtClean="0"/>
-              <a:t>9/8/2025</a:t>
+              <a:t>2/10/2026</a:t>
             </a:fld>
             <a:endParaRPr lang="en-US"/>
           </a:p>
@@ -1142,7 +1142,7 @@
           <a:p>
             <a:fld id="{B9739118-5D76-D243-9607-339F9C0D3323}" type="datetimeFigureOut">
               <a:rPr lang="en-US" smtClean="0"/>
-              <a:t>9/8/2025</a:t>
+              <a:t>2/10/2026</a:t>
             </a:fld>
             <a:endParaRPr lang="en-US"/>
           </a:p>
@@ -1407,7 +1407,7 @@
           <a:p>
             <a:fld id="{B9739118-5D76-D243-9607-339F9C0D3323}" type="datetimeFigureOut">
               <a:rPr lang="en-US" smtClean="0"/>
-              <a:t>9/8/2025</a:t>
+              <a:t>2/10/2026</a:t>
             </a:fld>
             <a:endParaRPr lang="en-US"/>
           </a:p>
@@ -1819,7 +1819,7 @@
           <a:p>
             <a:fld id="{B9739118-5D76-D243-9607-339F9C0D3323}" type="datetimeFigureOut">
               <a:rPr lang="en-US" smtClean="0"/>
-              <a:t>9/8/2025</a:t>
+              <a:t>2/10/2026</a:t>
             </a:fld>
             <a:endParaRPr lang="en-US"/>
           </a:p>
@@ -1960,7 +1960,7 @@
           <a:p>
             <a:fld id="{B9739118-5D76-D243-9607-339F9C0D3323}" type="datetimeFigureOut">
               <a:rPr lang="en-US" smtClean="0"/>
-              <a:t>9/8/2025</a:t>
+              <a:t>2/10/2026</a:t>
             </a:fld>
             <a:endParaRPr lang="en-US"/>
           </a:p>
@@ -2073,7 +2073,7 @@
           <a:p>
             <a:fld id="{B9739118-5D76-D243-9607-339F9C0D3323}" type="datetimeFigureOut">
               <a:rPr lang="en-US" smtClean="0"/>
-              <a:t>9/8/2025</a:t>
+              <a:t>2/10/2026</a:t>
             </a:fld>
             <a:endParaRPr lang="en-US"/>
           </a:p>
@@ -2384,7 +2384,7 @@
           <a:p>
             <a:fld id="{B9739118-5D76-D243-9607-339F9C0D3323}" type="datetimeFigureOut">
               <a:rPr lang="en-US" smtClean="0"/>
-              <a:t>9/8/2025</a:t>
+              <a:t>2/10/2026</a:t>
             </a:fld>
             <a:endParaRPr lang="en-US"/>
           </a:p>
@@ -2672,7 +2672,7 @@
           <a:p>
             <a:fld id="{B9739118-5D76-D243-9607-339F9C0D3323}" type="datetimeFigureOut">
               <a:rPr lang="en-US" smtClean="0"/>
-              <a:t>9/8/2025</a:t>
+              <a:t>2/10/2026</a:t>
             </a:fld>
             <a:endParaRPr lang="en-US"/>
           </a:p>
@@ -2913,7 +2913,7 @@
           <a:p>
             <a:fld id="{B9739118-5D76-D243-9607-339F9C0D3323}" type="datetimeFigureOut">
               <a:rPr lang="en-US" smtClean="0"/>
-              <a:t>9/8/2025</a:t>
+              <a:t>2/10/2026</a:t>
             </a:fld>
             <a:endParaRPr lang="en-US"/>
           </a:p>
@@ -4264,7 +4264,7 @@
         </p:nvGrpSpPr>
         <p:grpSpPr>
           <a:xfrm>
-            <a:off x="1981199" y="4873645"/>
+            <a:off x="1245908" y="4675682"/>
             <a:ext cx="1034144" cy="845341"/>
             <a:chOff x="1981199" y="4873645"/>
             <a:chExt cx="1034144" cy="845341"/>
@@ -4912,6 +4912,576 @@
             <a:p>
               <a:pPr algn="ctr"/>
               <a:endParaRPr lang="fr-FR"/>
+            </a:p>
+          </p:txBody>
+        </p:sp>
+      </p:grpSp>
+      <p:grpSp>
+        <p:nvGrpSpPr>
+          <p:cNvPr id="29" name="Groupe 28">
+            <a:extLst>
+              <a:ext uri="{FF2B5EF4-FFF2-40B4-BE49-F238E27FC236}">
+                <a16:creationId xmlns:a16="http://schemas.microsoft.com/office/drawing/2014/main" id="{7D28F769-116D-42E2-B87B-EA19C1C6C2BE}"/>
+              </a:ext>
+            </a:extLst>
+          </p:cNvPr>
+          <p:cNvGrpSpPr/>
+          <p:nvPr/>
+        </p:nvGrpSpPr>
+        <p:grpSpPr>
+          <a:xfrm>
+            <a:off x="3105037" y="4675682"/>
+            <a:ext cx="1034144" cy="845341"/>
+            <a:chOff x="1981199" y="4873645"/>
+            <a:chExt cx="1034144" cy="845341"/>
+          </a:xfrm>
+        </p:grpSpPr>
+        <p:sp>
+          <p:nvSpPr>
+            <p:cNvPr id="30" name="Freeform 12">
+              <a:extLst>
+                <a:ext uri="{FF2B5EF4-FFF2-40B4-BE49-F238E27FC236}">
+                  <a16:creationId xmlns:a16="http://schemas.microsoft.com/office/drawing/2014/main" id="{C60959BE-E032-49F4-B74B-BC663CADA546}"/>
+                </a:ext>
+              </a:extLst>
+            </p:cNvPr>
+            <p:cNvSpPr/>
+            <p:nvPr/>
+          </p:nvSpPr>
+          <p:spPr>
+            <a:xfrm>
+              <a:off x="1981199" y="5080000"/>
+              <a:ext cx="1034144" cy="638986"/>
+            </a:xfrm>
+            <a:custGeom>
+              <a:avLst/>
+              <a:gdLst>
+                <a:gd name="connsiteX0" fmla="*/ 0 w 1262743"/>
+                <a:gd name="connsiteY0" fmla="*/ 1175986 h 1175986"/>
+                <a:gd name="connsiteX1" fmla="*/ 478972 w 1262743"/>
+                <a:gd name="connsiteY1" fmla="*/ 914729 h 1175986"/>
+                <a:gd name="connsiteX2" fmla="*/ 609600 w 1262743"/>
+                <a:gd name="connsiteY2" fmla="*/ 329 h 1175986"/>
+                <a:gd name="connsiteX3" fmla="*/ 849086 w 1262743"/>
+                <a:gd name="connsiteY3" fmla="*/ 1023586 h 1175986"/>
+                <a:gd name="connsiteX4" fmla="*/ 1262743 w 1262743"/>
+                <a:gd name="connsiteY4" fmla="*/ 1154215 h 1175986"/>
+              </a:gdLst>
+              <a:ahLst/>
+              <a:cxnLst>
+                <a:cxn ang="0">
+                  <a:pos x="connsiteX0" y="connsiteY0"/>
+                </a:cxn>
+                <a:cxn ang="0">
+                  <a:pos x="connsiteX1" y="connsiteY1"/>
+                </a:cxn>
+                <a:cxn ang="0">
+                  <a:pos x="connsiteX2" y="connsiteY2"/>
+                </a:cxn>
+                <a:cxn ang="0">
+                  <a:pos x="connsiteX3" y="connsiteY3"/>
+                </a:cxn>
+                <a:cxn ang="0">
+                  <a:pos x="connsiteX4" y="connsiteY4"/>
+                </a:cxn>
+              </a:cxnLst>
+              <a:rect l="l" t="t" r="r" b="b"/>
+              <a:pathLst>
+                <a:path w="1262743" h="1175986">
+                  <a:moveTo>
+                    <a:pt x="0" y="1175986"/>
+                  </a:moveTo>
+                  <a:cubicBezTo>
+                    <a:pt x="188686" y="1143329"/>
+                    <a:pt x="377372" y="1110672"/>
+                    <a:pt x="478972" y="914729"/>
+                  </a:cubicBezTo>
+                  <a:cubicBezTo>
+                    <a:pt x="580572" y="718786"/>
+                    <a:pt x="547914" y="-17814"/>
+                    <a:pt x="609600" y="329"/>
+                  </a:cubicBezTo>
+                  <a:cubicBezTo>
+                    <a:pt x="671286" y="18472"/>
+                    <a:pt x="740229" y="831272"/>
+                    <a:pt x="849086" y="1023586"/>
+                  </a:cubicBezTo>
+                  <a:cubicBezTo>
+                    <a:pt x="957943" y="1215900"/>
+                    <a:pt x="1197429" y="1132444"/>
+                    <a:pt x="1262743" y="1154215"/>
+                  </a:cubicBezTo>
+                </a:path>
+              </a:pathLst>
+            </a:custGeom>
+            <a:noFill/>
+            <a:ln w="57150">
+              <a:solidFill>
+                <a:schemeClr val="tx1"/>
+              </a:solidFill>
+            </a:ln>
+          </p:spPr>
+          <p:style>
+            <a:lnRef idx="2">
+              <a:schemeClr val="accent1">
+                <a:shade val="15000"/>
+              </a:schemeClr>
+            </a:lnRef>
+            <a:fillRef idx="1">
+              <a:schemeClr val="accent1"/>
+            </a:fillRef>
+            <a:effectRef idx="0">
+              <a:schemeClr val="accent1"/>
+            </a:effectRef>
+            <a:fontRef idx="minor">
+              <a:schemeClr val="lt1"/>
+            </a:fontRef>
+          </p:style>
+          <p:txBody>
+            <a:bodyPr rtlCol="0" anchor="ctr"/>
+            <a:lstStyle/>
+            <a:p>
+              <a:pPr algn="ctr"/>
+              <a:endParaRPr lang="en-US" dirty="0"/>
+            </a:p>
+          </p:txBody>
+        </p:sp>
+        <p:sp>
+          <p:nvSpPr>
+            <p:cNvPr id="31" name="Rectangle : coins arrondis 30">
+              <a:extLst>
+                <a:ext uri="{FF2B5EF4-FFF2-40B4-BE49-F238E27FC236}">
+                  <a16:creationId xmlns:a16="http://schemas.microsoft.com/office/drawing/2014/main" id="{4D2D715B-2A0A-4CBB-98D7-C545E9F971EF}"/>
+                </a:ext>
+              </a:extLst>
+            </p:cNvPr>
+            <p:cNvSpPr/>
+            <p:nvPr/>
+          </p:nvSpPr>
+          <p:spPr>
+            <a:xfrm>
+              <a:off x="2593711" y="4873645"/>
+              <a:ext cx="410853" cy="283364"/>
+            </a:xfrm>
+            <a:prstGeom prst="roundRect">
+              <a:avLst/>
+            </a:prstGeom>
+            <a:noFill/>
+            <a:ln w="76200">
+              <a:solidFill>
+                <a:srgbClr val="0070C0"/>
+              </a:solidFill>
+            </a:ln>
+          </p:spPr>
+          <p:style>
+            <a:lnRef idx="2">
+              <a:schemeClr val="accent1">
+                <a:shade val="50000"/>
+              </a:schemeClr>
+            </a:lnRef>
+            <a:fillRef idx="1">
+              <a:schemeClr val="accent1"/>
+            </a:fillRef>
+            <a:effectRef idx="0">
+              <a:schemeClr val="accent1"/>
+            </a:effectRef>
+            <a:fontRef idx="minor">
+              <a:schemeClr val="lt1"/>
+            </a:fontRef>
+          </p:style>
+          <p:txBody>
+            <a:bodyPr rtlCol="0" anchor="ctr"/>
+            <a:lstStyle/>
+            <a:p>
+              <a:pPr algn="ctr"/>
+              <a:endParaRPr lang="en-US"/>
+            </a:p>
+          </p:txBody>
+        </p:sp>
+      </p:grpSp>
+      <p:grpSp>
+        <p:nvGrpSpPr>
+          <p:cNvPr id="12" name="Groupe 11">
+            <a:extLst>
+              <a:ext uri="{FF2B5EF4-FFF2-40B4-BE49-F238E27FC236}">
+                <a16:creationId xmlns:a16="http://schemas.microsoft.com/office/drawing/2014/main" id="{832E092B-6B3B-4AA3-A036-AE6E89B8F433}"/>
+              </a:ext>
+            </a:extLst>
+          </p:cNvPr>
+          <p:cNvGrpSpPr/>
+          <p:nvPr/>
+        </p:nvGrpSpPr>
+        <p:grpSpPr>
+          <a:xfrm>
+            <a:off x="4484634" y="4677720"/>
+            <a:ext cx="1018095" cy="857852"/>
+            <a:chOff x="4336330" y="4675683"/>
+            <a:chExt cx="1018095" cy="857852"/>
+          </a:xfrm>
+        </p:grpSpPr>
+        <p:sp>
+          <p:nvSpPr>
+            <p:cNvPr id="5" name="Forme libre : forme 4">
+              <a:extLst>
+                <a:ext uri="{FF2B5EF4-FFF2-40B4-BE49-F238E27FC236}">
+                  <a16:creationId xmlns:a16="http://schemas.microsoft.com/office/drawing/2014/main" id="{79237D64-D4D8-4859-BD6F-801F0CBE7A17}"/>
+                </a:ext>
+              </a:extLst>
+            </p:cNvPr>
+            <p:cNvSpPr/>
+            <p:nvPr/>
+          </p:nvSpPr>
+          <p:spPr>
+            <a:xfrm>
+              <a:off x="4694548" y="4966858"/>
+              <a:ext cx="527901" cy="547822"/>
+            </a:xfrm>
+            <a:custGeom>
+              <a:avLst/>
+              <a:gdLst>
+                <a:gd name="connsiteX0" fmla="*/ 0 w 527901"/>
+                <a:gd name="connsiteY0" fmla="*/ 547822 h 547822"/>
+                <a:gd name="connsiteX1" fmla="*/ 282805 w 527901"/>
+                <a:gd name="connsiteY1" fmla="*/ 349860 h 547822"/>
+                <a:gd name="connsiteX2" fmla="*/ 339365 w 527901"/>
+                <a:gd name="connsiteY2" fmla="*/ 1068 h 547822"/>
+                <a:gd name="connsiteX3" fmla="*/ 414780 w 527901"/>
+                <a:gd name="connsiteY3" fmla="*/ 472408 h 547822"/>
+                <a:gd name="connsiteX4" fmla="*/ 527901 w 527901"/>
+                <a:gd name="connsiteY4" fmla="*/ 519542 h 547822"/>
+              </a:gdLst>
+              <a:ahLst/>
+              <a:cxnLst>
+                <a:cxn ang="0">
+                  <a:pos x="connsiteX0" y="connsiteY0"/>
+                </a:cxn>
+                <a:cxn ang="0">
+                  <a:pos x="connsiteX1" y="connsiteY1"/>
+                </a:cxn>
+                <a:cxn ang="0">
+                  <a:pos x="connsiteX2" y="connsiteY2"/>
+                </a:cxn>
+                <a:cxn ang="0">
+                  <a:pos x="connsiteX3" y="connsiteY3"/>
+                </a:cxn>
+                <a:cxn ang="0">
+                  <a:pos x="connsiteX4" y="connsiteY4"/>
+                </a:cxn>
+              </a:cxnLst>
+              <a:rect l="l" t="t" r="r" b="b"/>
+              <a:pathLst>
+                <a:path w="527901" h="547822">
+                  <a:moveTo>
+                    <a:pt x="0" y="547822"/>
+                  </a:moveTo>
+                  <a:cubicBezTo>
+                    <a:pt x="113122" y="494404"/>
+                    <a:pt x="226244" y="440986"/>
+                    <a:pt x="282805" y="349860"/>
+                  </a:cubicBezTo>
+                  <a:cubicBezTo>
+                    <a:pt x="339366" y="258734"/>
+                    <a:pt x="317369" y="-19357"/>
+                    <a:pt x="339365" y="1068"/>
+                  </a:cubicBezTo>
+                  <a:cubicBezTo>
+                    <a:pt x="361361" y="21493"/>
+                    <a:pt x="383357" y="385996"/>
+                    <a:pt x="414780" y="472408"/>
+                  </a:cubicBezTo>
+                  <a:cubicBezTo>
+                    <a:pt x="446203" y="558820"/>
+                    <a:pt x="487052" y="539181"/>
+                    <a:pt x="527901" y="519542"/>
+                  </a:cubicBezTo>
+                </a:path>
+              </a:pathLst>
+            </a:custGeom>
+            <a:noFill/>
+            <a:ln w="57150">
+              <a:solidFill>
+                <a:schemeClr val="accent4">
+                  <a:lumMod val="75000"/>
+                </a:schemeClr>
+              </a:solidFill>
+            </a:ln>
+          </p:spPr>
+          <p:style>
+            <a:lnRef idx="2">
+              <a:schemeClr val="accent1">
+                <a:shade val="50000"/>
+              </a:schemeClr>
+            </a:lnRef>
+            <a:fillRef idx="1">
+              <a:schemeClr val="accent1"/>
+            </a:fillRef>
+            <a:effectRef idx="0">
+              <a:schemeClr val="accent1"/>
+            </a:effectRef>
+            <a:fontRef idx="minor">
+              <a:schemeClr val="lt1"/>
+            </a:fontRef>
+          </p:style>
+          <p:txBody>
+            <a:bodyPr rtlCol="0" anchor="ctr"/>
+            <a:lstStyle/>
+            <a:p>
+              <a:pPr algn="ctr"/>
+              <a:endParaRPr lang="en-US"/>
+            </a:p>
+          </p:txBody>
+        </p:sp>
+        <p:sp>
+          <p:nvSpPr>
+            <p:cNvPr id="34" name="Forme libre : forme 33">
+              <a:extLst>
+                <a:ext uri="{FF2B5EF4-FFF2-40B4-BE49-F238E27FC236}">
+                  <a16:creationId xmlns:a16="http://schemas.microsoft.com/office/drawing/2014/main" id="{C7422EAE-736E-45C0-A1B5-C716CE5B2222}"/>
+                </a:ext>
+              </a:extLst>
+            </p:cNvPr>
+            <p:cNvSpPr/>
+            <p:nvPr/>
+          </p:nvSpPr>
+          <p:spPr>
+            <a:xfrm>
+              <a:off x="4496586" y="4880000"/>
+              <a:ext cx="527901" cy="634680"/>
+            </a:xfrm>
+            <a:custGeom>
+              <a:avLst/>
+              <a:gdLst>
+                <a:gd name="connsiteX0" fmla="*/ 0 w 527901"/>
+                <a:gd name="connsiteY0" fmla="*/ 547822 h 547822"/>
+                <a:gd name="connsiteX1" fmla="*/ 282805 w 527901"/>
+                <a:gd name="connsiteY1" fmla="*/ 349860 h 547822"/>
+                <a:gd name="connsiteX2" fmla="*/ 339365 w 527901"/>
+                <a:gd name="connsiteY2" fmla="*/ 1068 h 547822"/>
+                <a:gd name="connsiteX3" fmla="*/ 414780 w 527901"/>
+                <a:gd name="connsiteY3" fmla="*/ 472408 h 547822"/>
+                <a:gd name="connsiteX4" fmla="*/ 527901 w 527901"/>
+                <a:gd name="connsiteY4" fmla="*/ 519542 h 547822"/>
+              </a:gdLst>
+              <a:ahLst/>
+              <a:cxnLst>
+                <a:cxn ang="0">
+                  <a:pos x="connsiteX0" y="connsiteY0"/>
+                </a:cxn>
+                <a:cxn ang="0">
+                  <a:pos x="connsiteX1" y="connsiteY1"/>
+                </a:cxn>
+                <a:cxn ang="0">
+                  <a:pos x="connsiteX2" y="connsiteY2"/>
+                </a:cxn>
+                <a:cxn ang="0">
+                  <a:pos x="connsiteX3" y="connsiteY3"/>
+                </a:cxn>
+                <a:cxn ang="0">
+                  <a:pos x="connsiteX4" y="connsiteY4"/>
+                </a:cxn>
+              </a:cxnLst>
+              <a:rect l="l" t="t" r="r" b="b"/>
+              <a:pathLst>
+                <a:path w="527901" h="547822">
+                  <a:moveTo>
+                    <a:pt x="0" y="547822"/>
+                  </a:moveTo>
+                  <a:cubicBezTo>
+                    <a:pt x="113122" y="494404"/>
+                    <a:pt x="226244" y="440986"/>
+                    <a:pt x="282805" y="349860"/>
+                  </a:cubicBezTo>
+                  <a:cubicBezTo>
+                    <a:pt x="339366" y="258734"/>
+                    <a:pt x="317369" y="-19357"/>
+                    <a:pt x="339365" y="1068"/>
+                  </a:cubicBezTo>
+                  <a:cubicBezTo>
+                    <a:pt x="361361" y="21493"/>
+                    <a:pt x="383357" y="385996"/>
+                    <a:pt x="414780" y="472408"/>
+                  </a:cubicBezTo>
+                  <a:cubicBezTo>
+                    <a:pt x="446203" y="558820"/>
+                    <a:pt x="487052" y="539181"/>
+                    <a:pt x="527901" y="519542"/>
+                  </a:cubicBezTo>
+                </a:path>
+              </a:pathLst>
+            </a:custGeom>
+            <a:noFill/>
+            <a:ln w="57150">
+              <a:solidFill>
+                <a:srgbClr val="C00000"/>
+              </a:solidFill>
+            </a:ln>
+          </p:spPr>
+          <p:style>
+            <a:lnRef idx="2">
+              <a:schemeClr val="accent1">
+                <a:shade val="50000"/>
+              </a:schemeClr>
+            </a:lnRef>
+            <a:fillRef idx="1">
+              <a:schemeClr val="accent1"/>
+            </a:fillRef>
+            <a:effectRef idx="0">
+              <a:schemeClr val="accent1"/>
+            </a:effectRef>
+            <a:fontRef idx="minor">
+              <a:schemeClr val="lt1"/>
+            </a:fontRef>
+          </p:style>
+          <p:txBody>
+            <a:bodyPr rtlCol="0" anchor="ctr"/>
+            <a:lstStyle/>
+            <a:p>
+              <a:pPr algn="ctr"/>
+              <a:endParaRPr lang="en-US">
+                <a:solidFill>
+                  <a:srgbClr val="C00000"/>
+                </a:solidFill>
+              </a:endParaRPr>
+            </a:p>
+          </p:txBody>
+        </p:sp>
+        <p:sp>
+          <p:nvSpPr>
+            <p:cNvPr id="8" name="Forme libre : forme 7">
+              <a:extLst>
+                <a:ext uri="{FF2B5EF4-FFF2-40B4-BE49-F238E27FC236}">
+                  <a16:creationId xmlns:a16="http://schemas.microsoft.com/office/drawing/2014/main" id="{800F63B7-1982-42B6-B359-AF8C3A716A37}"/>
+                </a:ext>
+              </a:extLst>
+            </p:cNvPr>
+            <p:cNvSpPr/>
+            <p:nvPr/>
+          </p:nvSpPr>
+          <p:spPr>
+            <a:xfrm>
+              <a:off x="4336330" y="4675683"/>
+              <a:ext cx="1018095" cy="857852"/>
+            </a:xfrm>
+            <a:custGeom>
+              <a:avLst/>
+              <a:gdLst>
+                <a:gd name="connsiteX0" fmla="*/ 0 w 1018095"/>
+                <a:gd name="connsiteY0" fmla="*/ 731177 h 731177"/>
+                <a:gd name="connsiteX1" fmla="*/ 282804 w 1018095"/>
+                <a:gd name="connsiteY1" fmla="*/ 599202 h 731177"/>
+                <a:gd name="connsiteX2" fmla="*/ 480767 w 1018095"/>
+                <a:gd name="connsiteY2" fmla="*/ 33594 h 731177"/>
+                <a:gd name="connsiteX3" fmla="*/ 603315 w 1018095"/>
+                <a:gd name="connsiteY3" fmla="*/ 61874 h 731177"/>
+                <a:gd name="connsiteX4" fmla="*/ 707010 w 1018095"/>
+                <a:gd name="connsiteY4" fmla="*/ 33594 h 731177"/>
+                <a:gd name="connsiteX5" fmla="*/ 791851 w 1018095"/>
+                <a:gd name="connsiteY5" fmla="*/ 109008 h 731177"/>
+                <a:gd name="connsiteX6" fmla="*/ 876693 w 1018095"/>
+                <a:gd name="connsiteY6" fmla="*/ 627482 h 731177"/>
+                <a:gd name="connsiteX7" fmla="*/ 1018095 w 1018095"/>
+                <a:gd name="connsiteY7" fmla="*/ 702897 h 731177"/>
+              </a:gdLst>
+              <a:ahLst/>
+              <a:cxnLst>
+                <a:cxn ang="0">
+                  <a:pos x="connsiteX0" y="connsiteY0"/>
+                </a:cxn>
+                <a:cxn ang="0">
+                  <a:pos x="connsiteX1" y="connsiteY1"/>
+                </a:cxn>
+                <a:cxn ang="0">
+                  <a:pos x="connsiteX2" y="connsiteY2"/>
+                </a:cxn>
+                <a:cxn ang="0">
+                  <a:pos x="connsiteX3" y="connsiteY3"/>
+                </a:cxn>
+                <a:cxn ang="0">
+                  <a:pos x="connsiteX4" y="connsiteY4"/>
+                </a:cxn>
+                <a:cxn ang="0">
+                  <a:pos x="connsiteX5" y="connsiteY5"/>
+                </a:cxn>
+                <a:cxn ang="0">
+                  <a:pos x="connsiteX6" y="connsiteY6"/>
+                </a:cxn>
+                <a:cxn ang="0">
+                  <a:pos x="connsiteX7" y="connsiteY7"/>
+                </a:cxn>
+              </a:cxnLst>
+              <a:rect l="l" t="t" r="r" b="b"/>
+              <a:pathLst>
+                <a:path w="1018095" h="731177">
+                  <a:moveTo>
+                    <a:pt x="0" y="731177"/>
+                  </a:moveTo>
+                  <a:cubicBezTo>
+                    <a:pt x="101338" y="723321"/>
+                    <a:pt x="202676" y="715466"/>
+                    <a:pt x="282804" y="599202"/>
+                  </a:cubicBezTo>
+                  <a:cubicBezTo>
+                    <a:pt x="362932" y="482938"/>
+                    <a:pt x="427349" y="123149"/>
+                    <a:pt x="480767" y="33594"/>
+                  </a:cubicBezTo>
+                  <a:cubicBezTo>
+                    <a:pt x="534185" y="-55961"/>
+                    <a:pt x="565608" y="61874"/>
+                    <a:pt x="603315" y="61874"/>
+                  </a:cubicBezTo>
+                  <a:cubicBezTo>
+                    <a:pt x="641022" y="61874"/>
+                    <a:pt x="675587" y="25738"/>
+                    <a:pt x="707010" y="33594"/>
+                  </a:cubicBezTo>
+                  <a:cubicBezTo>
+                    <a:pt x="738433" y="41450"/>
+                    <a:pt x="763571" y="10027"/>
+                    <a:pt x="791851" y="109008"/>
+                  </a:cubicBezTo>
+                  <a:cubicBezTo>
+                    <a:pt x="820132" y="207989"/>
+                    <a:pt x="838986" y="528500"/>
+                    <a:pt x="876693" y="627482"/>
+                  </a:cubicBezTo>
+                  <a:cubicBezTo>
+                    <a:pt x="914400" y="726463"/>
+                    <a:pt x="999242" y="701326"/>
+                    <a:pt x="1018095" y="702897"/>
+                  </a:cubicBezTo>
+                </a:path>
+              </a:pathLst>
+            </a:custGeom>
+            <a:noFill/>
+            <a:ln w="57150">
+              <a:solidFill>
+                <a:schemeClr val="tx1"/>
+              </a:solidFill>
+            </a:ln>
+          </p:spPr>
+          <p:style>
+            <a:lnRef idx="2">
+              <a:schemeClr val="accent1">
+                <a:shade val="50000"/>
+              </a:schemeClr>
+            </a:lnRef>
+            <a:fillRef idx="1">
+              <a:schemeClr val="accent1"/>
+            </a:fillRef>
+            <a:effectRef idx="0">
+              <a:schemeClr val="accent1"/>
+            </a:effectRef>
+            <a:fontRef idx="minor">
+              <a:schemeClr val="lt1"/>
+            </a:fontRef>
+          </p:style>
+          <p:txBody>
+            <a:bodyPr rtlCol="0" anchor="ctr"/>
+            <a:lstStyle/>
+            <a:p>
+              <a:pPr algn="ctr"/>
+              <a:endParaRPr lang="en-US"/>
             </a:p>
           </p:txBody>
         </p:sp>

</xml_diff>